<commit_message>
ultimos cambios y nuevos archivos bugs e informe de bug
</commit_message>
<xml_diff>
--- a/Evidencia.pptx
+++ b/Evidencia.pptx
@@ -10,6 +10,17 @@
     <p:sldId id="258" r:id="rId4"/>
     <p:sldId id="259" r:id="rId5"/>
     <p:sldId id="260" r:id="rId6"/>
+    <p:sldId id="261" r:id="rId7"/>
+    <p:sldId id="275" r:id="rId8"/>
+    <p:sldId id="262" r:id="rId9"/>
+    <p:sldId id="264" r:id="rId10"/>
+    <p:sldId id="267" r:id="rId11"/>
+    <p:sldId id="269" r:id="rId12"/>
+    <p:sldId id="268" r:id="rId13"/>
+    <p:sldId id="270" r:id="rId14"/>
+    <p:sldId id="271" r:id="rId15"/>
+    <p:sldId id="272" r:id="rId16"/>
+    <p:sldId id="273" r:id="rId17"/>
   </p:sldIdLst>
   <p:sldSz cx="12192000" cy="6858000"/>
   <p:notesSz cx="6858000" cy="9144000"/>
@@ -108,6 +119,11 @@
       </a:defRPr>
     </a:lvl9pPr>
   </p:defaultTextStyle>
+  <p:extLst>
+    <p:ext uri="{EFAFB233-063F-42B5-8137-9DF3F51BA10A}">
+      <p15:sldGuideLst xmlns:p15="http://schemas.microsoft.com/office/powerpoint/2012/main"/>
+    </p:ext>
+  </p:extLst>
 </p:presentation>
 </file>
 
@@ -260,7 +276,7 @@
           <a:p>
             <a:fld id="{59260B2C-E5E7-413C-BF9E-45D7CA7CE961}" type="datetimeFigureOut">
               <a:rPr lang="es-PE" smtClean="0"/>
-              <a:t>3/11/2025</a:t>
+              <a:t>9/11/2025</a:t>
             </a:fld>
             <a:endParaRPr lang="es-PE"/>
           </a:p>
@@ -460,7 +476,7 @@
           <a:p>
             <a:fld id="{59260B2C-E5E7-413C-BF9E-45D7CA7CE961}" type="datetimeFigureOut">
               <a:rPr lang="es-PE" smtClean="0"/>
-              <a:t>3/11/2025</a:t>
+              <a:t>9/11/2025</a:t>
             </a:fld>
             <a:endParaRPr lang="es-PE"/>
           </a:p>
@@ -670,7 +686,7 @@
           <a:p>
             <a:fld id="{59260B2C-E5E7-413C-BF9E-45D7CA7CE961}" type="datetimeFigureOut">
               <a:rPr lang="es-PE" smtClean="0"/>
-              <a:t>3/11/2025</a:t>
+              <a:t>9/11/2025</a:t>
             </a:fld>
             <a:endParaRPr lang="es-PE"/>
           </a:p>
@@ -870,7 +886,7 @@
           <a:p>
             <a:fld id="{59260B2C-E5E7-413C-BF9E-45D7CA7CE961}" type="datetimeFigureOut">
               <a:rPr lang="es-PE" smtClean="0"/>
-              <a:t>3/11/2025</a:t>
+              <a:t>9/11/2025</a:t>
             </a:fld>
             <a:endParaRPr lang="es-PE"/>
           </a:p>
@@ -1146,7 +1162,7 @@
           <a:p>
             <a:fld id="{59260B2C-E5E7-413C-BF9E-45D7CA7CE961}" type="datetimeFigureOut">
               <a:rPr lang="es-PE" smtClean="0"/>
-              <a:t>3/11/2025</a:t>
+              <a:t>9/11/2025</a:t>
             </a:fld>
             <a:endParaRPr lang="es-PE"/>
           </a:p>
@@ -1414,7 +1430,7 @@
           <a:p>
             <a:fld id="{59260B2C-E5E7-413C-BF9E-45D7CA7CE961}" type="datetimeFigureOut">
               <a:rPr lang="es-PE" smtClean="0"/>
-              <a:t>3/11/2025</a:t>
+              <a:t>9/11/2025</a:t>
             </a:fld>
             <a:endParaRPr lang="es-PE"/>
           </a:p>
@@ -1829,7 +1845,7 @@
           <a:p>
             <a:fld id="{59260B2C-E5E7-413C-BF9E-45D7CA7CE961}" type="datetimeFigureOut">
               <a:rPr lang="es-PE" smtClean="0"/>
-              <a:t>3/11/2025</a:t>
+              <a:t>9/11/2025</a:t>
             </a:fld>
             <a:endParaRPr lang="es-PE"/>
           </a:p>
@@ -1971,7 +1987,7 @@
           <a:p>
             <a:fld id="{59260B2C-E5E7-413C-BF9E-45D7CA7CE961}" type="datetimeFigureOut">
               <a:rPr lang="es-PE" smtClean="0"/>
-              <a:t>3/11/2025</a:t>
+              <a:t>9/11/2025</a:t>
             </a:fld>
             <a:endParaRPr lang="es-PE"/>
           </a:p>
@@ -2084,7 +2100,7 @@
           <a:p>
             <a:fld id="{59260B2C-E5E7-413C-BF9E-45D7CA7CE961}" type="datetimeFigureOut">
               <a:rPr lang="es-PE" smtClean="0"/>
-              <a:t>3/11/2025</a:t>
+              <a:t>9/11/2025</a:t>
             </a:fld>
             <a:endParaRPr lang="es-PE"/>
           </a:p>
@@ -2397,7 +2413,7 @@
           <a:p>
             <a:fld id="{59260B2C-E5E7-413C-BF9E-45D7CA7CE961}" type="datetimeFigureOut">
               <a:rPr lang="es-PE" smtClean="0"/>
-              <a:t>3/11/2025</a:t>
+              <a:t>9/11/2025</a:t>
             </a:fld>
             <a:endParaRPr lang="es-PE"/>
           </a:p>
@@ -2686,7 +2702,7 @@
           <a:p>
             <a:fld id="{59260B2C-E5E7-413C-BF9E-45D7CA7CE961}" type="datetimeFigureOut">
               <a:rPr lang="es-PE" smtClean="0"/>
-              <a:t>3/11/2025</a:t>
+              <a:t>9/11/2025</a:t>
             </a:fld>
             <a:endParaRPr lang="es-PE"/>
           </a:p>
@@ -2929,7 +2945,7 @@
           <a:p>
             <a:fld id="{59260B2C-E5E7-413C-BF9E-45D7CA7CE961}" type="datetimeFigureOut">
               <a:rPr lang="es-PE" smtClean="0"/>
-              <a:t>3/11/2025</a:t>
+              <a:t>9/11/2025</a:t>
             </a:fld>
             <a:endParaRPr lang="es-PE"/>
           </a:p>
@@ -3461,6 +3477,1071 @@
 </p:sld>
 </file>
 
+<file path=ppt/slides/slide10.xml><?xml version="1.0" encoding="utf-8"?>
+<p:sld xmlns:a="http://schemas.openxmlformats.org/drawingml/2006/main" xmlns:r="http://schemas.openxmlformats.org/officeDocument/2006/relationships" xmlns:p="http://schemas.openxmlformats.org/presentationml/2006/main">
+  <p:cSld>
+    <p:spTree>
+      <p:nvGrpSpPr>
+        <p:cNvPr id="1" name=""/>
+        <p:cNvGrpSpPr/>
+        <p:nvPr/>
+      </p:nvGrpSpPr>
+      <p:grpSpPr>
+        <a:xfrm>
+          <a:off x="0" y="0"/>
+          <a:ext cx="0" cy="0"/>
+          <a:chOff x="0" y="0"/>
+          <a:chExt cx="0" cy="0"/>
+        </a:xfrm>
+      </p:grpSpPr>
+      <p:sp>
+        <p:nvSpPr>
+          <p:cNvPr id="2" name="Título 1">
+            <a:extLst>
+              <a:ext uri="{FF2B5EF4-FFF2-40B4-BE49-F238E27FC236}">
+                <a16:creationId xmlns:a16="http://schemas.microsoft.com/office/drawing/2014/main" id="{B06D6EE1-5A55-489E-9809-7B85B20F30CA}"/>
+              </a:ext>
+            </a:extLst>
+          </p:cNvPr>
+          <p:cNvSpPr>
+            <a:spLocks noGrp="1"/>
+          </p:cNvSpPr>
+          <p:nvPr>
+            <p:ph type="title"/>
+          </p:nvPr>
+        </p:nvSpPr>
+        <p:spPr>
+          <a:xfrm>
+            <a:off x="794657" y="2538287"/>
+            <a:ext cx="2717800" cy="802493"/>
+          </a:xfrm>
+        </p:spPr>
+        <p:txBody>
+          <a:bodyPr>
+            <a:normAutofit fontScale="90000"/>
+          </a:bodyPr>
+          <a:lstStyle/>
+          <a:p>
+            <a:r>
+              <a:rPr lang="es-PE" sz="4900" b="1" dirty="0"/>
+              <a:t>EVIDENCIA TC-009</a:t>
+            </a:r>
+            <a:br>
+              <a:rPr lang="es-PE" dirty="0"/>
+            </a:br>
+            <a:endParaRPr lang="es-PE" dirty="0"/>
+          </a:p>
+        </p:txBody>
+      </p:sp>
+      <p:pic>
+        <p:nvPicPr>
+          <p:cNvPr id="5" name="Imagen 4">
+            <a:extLst>
+              <a:ext uri="{FF2B5EF4-FFF2-40B4-BE49-F238E27FC236}">
+                <a16:creationId xmlns:a16="http://schemas.microsoft.com/office/drawing/2014/main" id="{05386D0D-E590-48D1-A61D-CBBAE381ECE9}"/>
+              </a:ext>
+            </a:extLst>
+          </p:cNvPr>
+          <p:cNvPicPr>
+            <a:picLocks noChangeAspect="1"/>
+          </p:cNvPicPr>
+          <p:nvPr/>
+        </p:nvPicPr>
+        <p:blipFill>
+          <a:blip r:embed="rId2">
+            <a:extLst>
+              <a:ext uri="{28A0092B-C50C-407E-A947-70E740481C1C}">
+                <a14:useLocalDpi xmlns:a14="http://schemas.microsoft.com/office/drawing/2010/main" val="0"/>
+              </a:ext>
+            </a:extLst>
+          </a:blip>
+          <a:stretch>
+            <a:fillRect/>
+          </a:stretch>
+        </p:blipFill>
+        <p:spPr>
+          <a:xfrm>
+            <a:off x="4563268" y="399142"/>
+            <a:ext cx="2795044" cy="6059715"/>
+          </a:xfrm>
+          <a:prstGeom prst="rect">
+            <a:avLst/>
+          </a:prstGeom>
+        </p:spPr>
+      </p:pic>
+      <p:pic>
+        <p:nvPicPr>
+          <p:cNvPr id="7" name="Imagen 6">
+            <a:extLst>
+              <a:ext uri="{FF2B5EF4-FFF2-40B4-BE49-F238E27FC236}">
+                <a16:creationId xmlns:a16="http://schemas.microsoft.com/office/drawing/2014/main" id="{4C7291E7-B5BF-4F01-AF5F-2342EC2BE981}"/>
+              </a:ext>
+            </a:extLst>
+          </p:cNvPr>
+          <p:cNvPicPr>
+            <a:picLocks noChangeAspect="1"/>
+          </p:cNvPicPr>
+          <p:nvPr/>
+        </p:nvPicPr>
+        <p:blipFill>
+          <a:blip r:embed="rId3">
+            <a:extLst>
+              <a:ext uri="{28A0092B-C50C-407E-A947-70E740481C1C}">
+                <a14:useLocalDpi xmlns:a14="http://schemas.microsoft.com/office/drawing/2010/main" val="0"/>
+              </a:ext>
+            </a:extLst>
+          </a:blip>
+          <a:stretch>
+            <a:fillRect/>
+          </a:stretch>
+        </p:blipFill>
+        <p:spPr>
+          <a:xfrm>
+            <a:off x="8236534" y="399142"/>
+            <a:ext cx="2795044" cy="6059716"/>
+          </a:xfrm>
+          <a:prstGeom prst="rect">
+            <a:avLst/>
+          </a:prstGeom>
+        </p:spPr>
+      </p:pic>
+    </p:spTree>
+    <p:extLst>
+      <p:ext uri="{BB962C8B-B14F-4D97-AF65-F5344CB8AC3E}">
+        <p14:creationId xmlns:p14="http://schemas.microsoft.com/office/powerpoint/2010/main" val="3663053939"/>
+      </p:ext>
+    </p:extLst>
+  </p:cSld>
+  <p:clrMapOvr>
+    <a:masterClrMapping/>
+  </p:clrMapOvr>
+</p:sld>
+</file>
+
+<file path=ppt/slides/slide11.xml><?xml version="1.0" encoding="utf-8"?>
+<p:sld xmlns:a="http://schemas.openxmlformats.org/drawingml/2006/main" xmlns:r="http://schemas.openxmlformats.org/officeDocument/2006/relationships" xmlns:p="http://schemas.openxmlformats.org/presentationml/2006/main">
+  <p:cSld>
+    <p:spTree>
+      <p:nvGrpSpPr>
+        <p:cNvPr id="1" name=""/>
+        <p:cNvGrpSpPr/>
+        <p:nvPr/>
+      </p:nvGrpSpPr>
+      <p:grpSpPr>
+        <a:xfrm>
+          <a:off x="0" y="0"/>
+          <a:ext cx="0" cy="0"/>
+          <a:chOff x="0" y="0"/>
+          <a:chExt cx="0" cy="0"/>
+        </a:xfrm>
+      </p:grpSpPr>
+      <p:sp>
+        <p:nvSpPr>
+          <p:cNvPr id="2" name="Título 1">
+            <a:extLst>
+              <a:ext uri="{FF2B5EF4-FFF2-40B4-BE49-F238E27FC236}">
+                <a16:creationId xmlns:a16="http://schemas.microsoft.com/office/drawing/2014/main" id="{B06D6EE1-5A55-489E-9809-7B85B20F30CA}"/>
+              </a:ext>
+            </a:extLst>
+          </p:cNvPr>
+          <p:cNvSpPr>
+            <a:spLocks noGrp="1"/>
+          </p:cNvSpPr>
+          <p:nvPr>
+            <p:ph type="title"/>
+          </p:nvPr>
+        </p:nvSpPr>
+        <p:spPr>
+          <a:xfrm>
+            <a:off x="591457" y="3027753"/>
+            <a:ext cx="2717800" cy="802493"/>
+          </a:xfrm>
+        </p:spPr>
+        <p:txBody>
+          <a:bodyPr>
+            <a:normAutofit fontScale="90000"/>
+          </a:bodyPr>
+          <a:lstStyle/>
+          <a:p>
+            <a:r>
+              <a:rPr lang="es-PE" sz="4900" b="1" dirty="0"/>
+              <a:t>EVIDENCIA TC-010</a:t>
+            </a:r>
+            <a:br>
+              <a:rPr lang="es-PE" sz="4900" b="1" dirty="0"/>
+            </a:br>
+            <a:br>
+              <a:rPr lang="es-PE" dirty="0"/>
+            </a:br>
+            <a:endParaRPr lang="es-PE" dirty="0"/>
+          </a:p>
+        </p:txBody>
+      </p:sp>
+      <p:pic>
+        <p:nvPicPr>
+          <p:cNvPr id="4" name="Imagen 3">
+            <a:extLst>
+              <a:ext uri="{FF2B5EF4-FFF2-40B4-BE49-F238E27FC236}">
+                <a16:creationId xmlns:a16="http://schemas.microsoft.com/office/drawing/2014/main" id="{1635076B-E482-4229-9E00-9373B68BAAA7}"/>
+              </a:ext>
+            </a:extLst>
+          </p:cNvPr>
+          <p:cNvPicPr>
+            <a:picLocks noChangeAspect="1"/>
+          </p:cNvPicPr>
+          <p:nvPr/>
+        </p:nvPicPr>
+        <p:blipFill>
+          <a:blip r:embed="rId2">
+            <a:extLst>
+              <a:ext uri="{28A0092B-C50C-407E-A947-70E740481C1C}">
+                <a14:useLocalDpi xmlns:a14="http://schemas.microsoft.com/office/drawing/2010/main" val="0"/>
+              </a:ext>
+            </a:extLst>
+          </a:blip>
+          <a:stretch>
+            <a:fillRect/>
+          </a:stretch>
+        </p:blipFill>
+        <p:spPr>
+          <a:xfrm>
+            <a:off x="3309257" y="482875"/>
+            <a:ext cx="2717800" cy="5892248"/>
+          </a:xfrm>
+          <a:prstGeom prst="rect">
+            <a:avLst/>
+          </a:prstGeom>
+        </p:spPr>
+      </p:pic>
+      <p:pic>
+        <p:nvPicPr>
+          <p:cNvPr id="6" name="Imagen 5">
+            <a:extLst>
+              <a:ext uri="{FF2B5EF4-FFF2-40B4-BE49-F238E27FC236}">
+                <a16:creationId xmlns:a16="http://schemas.microsoft.com/office/drawing/2014/main" id="{59069EB3-1120-4709-8C16-CE906A17CE2C}"/>
+              </a:ext>
+            </a:extLst>
+          </p:cNvPr>
+          <p:cNvPicPr>
+            <a:picLocks noChangeAspect="1"/>
+          </p:cNvPicPr>
+          <p:nvPr/>
+        </p:nvPicPr>
+        <p:blipFill>
+          <a:blip r:embed="rId3">
+            <a:extLst>
+              <a:ext uri="{28A0092B-C50C-407E-A947-70E740481C1C}">
+                <a14:useLocalDpi xmlns:a14="http://schemas.microsoft.com/office/drawing/2010/main" val="0"/>
+              </a:ext>
+            </a:extLst>
+          </a:blip>
+          <a:stretch>
+            <a:fillRect/>
+          </a:stretch>
+        </p:blipFill>
+        <p:spPr>
+          <a:xfrm>
+            <a:off x="6164944" y="482875"/>
+            <a:ext cx="2717799" cy="5892248"/>
+          </a:xfrm>
+          <a:prstGeom prst="rect">
+            <a:avLst/>
+          </a:prstGeom>
+        </p:spPr>
+      </p:pic>
+      <p:pic>
+        <p:nvPicPr>
+          <p:cNvPr id="8" name="Imagen 7">
+            <a:extLst>
+              <a:ext uri="{FF2B5EF4-FFF2-40B4-BE49-F238E27FC236}">
+                <a16:creationId xmlns:a16="http://schemas.microsoft.com/office/drawing/2014/main" id="{DB50545A-1266-4FF4-A35D-45F74A14776D}"/>
+              </a:ext>
+            </a:extLst>
+          </p:cNvPr>
+          <p:cNvPicPr>
+            <a:picLocks noChangeAspect="1"/>
+          </p:cNvPicPr>
+          <p:nvPr/>
+        </p:nvPicPr>
+        <p:blipFill>
+          <a:blip r:embed="rId4">
+            <a:extLst>
+              <a:ext uri="{28A0092B-C50C-407E-A947-70E740481C1C}">
+                <a14:useLocalDpi xmlns:a14="http://schemas.microsoft.com/office/drawing/2010/main" val="0"/>
+              </a:ext>
+            </a:extLst>
+          </a:blip>
+          <a:stretch>
+            <a:fillRect/>
+          </a:stretch>
+        </p:blipFill>
+        <p:spPr>
+          <a:xfrm>
+            <a:off x="9016999" y="482875"/>
+            <a:ext cx="2717800" cy="5892248"/>
+          </a:xfrm>
+          <a:prstGeom prst="rect">
+            <a:avLst/>
+          </a:prstGeom>
+        </p:spPr>
+      </p:pic>
+    </p:spTree>
+    <p:extLst>
+      <p:ext uri="{BB962C8B-B14F-4D97-AF65-F5344CB8AC3E}">
+        <p14:creationId xmlns:p14="http://schemas.microsoft.com/office/powerpoint/2010/main" val="3278885382"/>
+      </p:ext>
+    </p:extLst>
+  </p:cSld>
+  <p:clrMapOvr>
+    <a:masterClrMapping/>
+  </p:clrMapOvr>
+</p:sld>
+</file>
+
+<file path=ppt/slides/slide12.xml><?xml version="1.0" encoding="utf-8"?>
+<p:sld xmlns:a="http://schemas.openxmlformats.org/drawingml/2006/main" xmlns:r="http://schemas.openxmlformats.org/officeDocument/2006/relationships" xmlns:p="http://schemas.openxmlformats.org/presentationml/2006/main">
+  <p:cSld>
+    <p:spTree>
+      <p:nvGrpSpPr>
+        <p:cNvPr id="1" name=""/>
+        <p:cNvGrpSpPr/>
+        <p:nvPr/>
+      </p:nvGrpSpPr>
+      <p:grpSpPr>
+        <a:xfrm>
+          <a:off x="0" y="0"/>
+          <a:ext cx="0" cy="0"/>
+          <a:chOff x="0" y="0"/>
+          <a:chExt cx="0" cy="0"/>
+        </a:xfrm>
+      </p:grpSpPr>
+      <p:sp>
+        <p:nvSpPr>
+          <p:cNvPr id="2" name="Título 1">
+            <a:extLst>
+              <a:ext uri="{FF2B5EF4-FFF2-40B4-BE49-F238E27FC236}">
+                <a16:creationId xmlns:a16="http://schemas.microsoft.com/office/drawing/2014/main" id="{B06D6EE1-5A55-489E-9809-7B85B20F30CA}"/>
+              </a:ext>
+            </a:extLst>
+          </p:cNvPr>
+          <p:cNvSpPr>
+            <a:spLocks noGrp="1"/>
+          </p:cNvSpPr>
+          <p:nvPr>
+            <p:ph type="title"/>
+          </p:nvPr>
+        </p:nvSpPr>
+        <p:spPr>
+          <a:xfrm>
+            <a:off x="794657" y="2538287"/>
+            <a:ext cx="2717800" cy="802493"/>
+          </a:xfrm>
+        </p:spPr>
+        <p:txBody>
+          <a:bodyPr>
+            <a:normAutofit fontScale="90000"/>
+          </a:bodyPr>
+          <a:lstStyle/>
+          <a:p>
+            <a:r>
+              <a:rPr lang="es-PE" sz="4900" b="1" dirty="0"/>
+              <a:t>EVIDENCIA TC-011</a:t>
+            </a:r>
+            <a:br>
+              <a:rPr lang="es-PE" dirty="0"/>
+            </a:br>
+            <a:endParaRPr lang="es-PE" dirty="0"/>
+          </a:p>
+        </p:txBody>
+      </p:sp>
+      <p:pic>
+        <p:nvPicPr>
+          <p:cNvPr id="4" name="Imagen 3">
+            <a:extLst>
+              <a:ext uri="{FF2B5EF4-FFF2-40B4-BE49-F238E27FC236}">
+                <a16:creationId xmlns:a16="http://schemas.microsoft.com/office/drawing/2014/main" id="{8067D75C-7882-459A-A788-9F11E3975ED1}"/>
+              </a:ext>
+            </a:extLst>
+          </p:cNvPr>
+          <p:cNvPicPr>
+            <a:picLocks noChangeAspect="1"/>
+          </p:cNvPicPr>
+          <p:nvPr/>
+        </p:nvPicPr>
+        <p:blipFill>
+          <a:blip r:embed="rId2">
+            <a:extLst>
+              <a:ext uri="{28A0092B-C50C-407E-A947-70E740481C1C}">
+                <a14:useLocalDpi xmlns:a14="http://schemas.microsoft.com/office/drawing/2010/main" val="0"/>
+              </a:ext>
+            </a:extLst>
+          </a:blip>
+          <a:stretch>
+            <a:fillRect/>
+          </a:stretch>
+        </p:blipFill>
+        <p:spPr>
+          <a:xfrm>
+            <a:off x="6260930" y="624115"/>
+            <a:ext cx="2684581" cy="5820228"/>
+          </a:xfrm>
+          <a:prstGeom prst="rect">
+            <a:avLst/>
+          </a:prstGeom>
+        </p:spPr>
+      </p:pic>
+    </p:spTree>
+    <p:extLst>
+      <p:ext uri="{BB962C8B-B14F-4D97-AF65-F5344CB8AC3E}">
+        <p14:creationId xmlns:p14="http://schemas.microsoft.com/office/powerpoint/2010/main" val="1737713029"/>
+      </p:ext>
+    </p:extLst>
+  </p:cSld>
+  <p:clrMapOvr>
+    <a:masterClrMapping/>
+  </p:clrMapOvr>
+</p:sld>
+</file>
+
+<file path=ppt/slides/slide13.xml><?xml version="1.0" encoding="utf-8"?>
+<p:sld xmlns:a="http://schemas.openxmlformats.org/drawingml/2006/main" xmlns:r="http://schemas.openxmlformats.org/officeDocument/2006/relationships" xmlns:p="http://schemas.openxmlformats.org/presentationml/2006/main">
+  <p:cSld>
+    <p:spTree>
+      <p:nvGrpSpPr>
+        <p:cNvPr id="1" name=""/>
+        <p:cNvGrpSpPr/>
+        <p:nvPr/>
+      </p:nvGrpSpPr>
+      <p:grpSpPr>
+        <a:xfrm>
+          <a:off x="0" y="0"/>
+          <a:ext cx="0" cy="0"/>
+          <a:chOff x="0" y="0"/>
+          <a:chExt cx="0" cy="0"/>
+        </a:xfrm>
+      </p:grpSpPr>
+      <p:sp>
+        <p:nvSpPr>
+          <p:cNvPr id="2" name="Título 1">
+            <a:extLst>
+              <a:ext uri="{FF2B5EF4-FFF2-40B4-BE49-F238E27FC236}">
+                <a16:creationId xmlns:a16="http://schemas.microsoft.com/office/drawing/2014/main" id="{B06D6EE1-5A55-489E-9809-7B85B20F30CA}"/>
+              </a:ext>
+            </a:extLst>
+          </p:cNvPr>
+          <p:cNvSpPr>
+            <a:spLocks noGrp="1"/>
+          </p:cNvSpPr>
+          <p:nvPr>
+            <p:ph type="title"/>
+          </p:nvPr>
+        </p:nvSpPr>
+        <p:spPr>
+          <a:xfrm>
+            <a:off x="794657" y="2538287"/>
+            <a:ext cx="2717800" cy="802493"/>
+          </a:xfrm>
+        </p:spPr>
+        <p:txBody>
+          <a:bodyPr>
+            <a:normAutofit fontScale="90000"/>
+          </a:bodyPr>
+          <a:lstStyle/>
+          <a:p>
+            <a:r>
+              <a:rPr lang="es-PE" sz="4900" b="1" dirty="0"/>
+              <a:t>EVIDENCIA TC-012</a:t>
+            </a:r>
+            <a:br>
+              <a:rPr lang="es-PE" dirty="0"/>
+            </a:br>
+            <a:endParaRPr lang="es-PE" dirty="0"/>
+          </a:p>
+        </p:txBody>
+      </p:sp>
+      <p:pic>
+        <p:nvPicPr>
+          <p:cNvPr id="4" name="Imagen 3">
+            <a:extLst>
+              <a:ext uri="{FF2B5EF4-FFF2-40B4-BE49-F238E27FC236}">
+                <a16:creationId xmlns:a16="http://schemas.microsoft.com/office/drawing/2014/main" id="{BAB31709-A553-4F17-8C05-C801825F819B}"/>
+              </a:ext>
+            </a:extLst>
+          </p:cNvPr>
+          <p:cNvPicPr>
+            <a:picLocks noChangeAspect="1"/>
+          </p:cNvPicPr>
+          <p:nvPr/>
+        </p:nvPicPr>
+        <p:blipFill>
+          <a:blip r:embed="rId2">
+            <a:extLst>
+              <a:ext uri="{28A0092B-C50C-407E-A947-70E740481C1C}">
+                <a14:useLocalDpi xmlns:a14="http://schemas.microsoft.com/office/drawing/2010/main" val="0"/>
+              </a:ext>
+            </a:extLst>
+          </a:blip>
+          <a:stretch>
+            <a:fillRect/>
+          </a:stretch>
+        </p:blipFill>
+        <p:spPr>
+          <a:xfrm>
+            <a:off x="4550949" y="464457"/>
+            <a:ext cx="2734791" cy="5929085"/>
+          </a:xfrm>
+          <a:prstGeom prst="rect">
+            <a:avLst/>
+          </a:prstGeom>
+        </p:spPr>
+      </p:pic>
+      <p:pic>
+        <p:nvPicPr>
+          <p:cNvPr id="6" name="Imagen 5">
+            <a:extLst>
+              <a:ext uri="{FF2B5EF4-FFF2-40B4-BE49-F238E27FC236}">
+                <a16:creationId xmlns:a16="http://schemas.microsoft.com/office/drawing/2014/main" id="{E9C73FE8-E0E3-464E-A8A1-9A933241F1EF}"/>
+              </a:ext>
+            </a:extLst>
+          </p:cNvPr>
+          <p:cNvPicPr>
+            <a:picLocks noChangeAspect="1"/>
+          </p:cNvPicPr>
+          <p:nvPr/>
+        </p:nvPicPr>
+        <p:blipFill>
+          <a:blip r:embed="rId3">
+            <a:extLst>
+              <a:ext uri="{28A0092B-C50C-407E-A947-70E740481C1C}">
+                <a14:useLocalDpi xmlns:a14="http://schemas.microsoft.com/office/drawing/2010/main" val="0"/>
+              </a:ext>
+            </a:extLst>
+          </a:blip>
+          <a:stretch>
+            <a:fillRect/>
+          </a:stretch>
+        </p:blipFill>
+        <p:spPr>
+          <a:xfrm>
+            <a:off x="8063406" y="464457"/>
+            <a:ext cx="2734791" cy="5929085"/>
+          </a:xfrm>
+          <a:prstGeom prst="rect">
+            <a:avLst/>
+          </a:prstGeom>
+        </p:spPr>
+      </p:pic>
+    </p:spTree>
+    <p:extLst>
+      <p:ext uri="{BB962C8B-B14F-4D97-AF65-F5344CB8AC3E}">
+        <p14:creationId xmlns:p14="http://schemas.microsoft.com/office/powerpoint/2010/main" val="3705606829"/>
+      </p:ext>
+    </p:extLst>
+  </p:cSld>
+  <p:clrMapOvr>
+    <a:masterClrMapping/>
+  </p:clrMapOvr>
+</p:sld>
+</file>
+
+<file path=ppt/slides/slide14.xml><?xml version="1.0" encoding="utf-8"?>
+<p:sld xmlns:a="http://schemas.openxmlformats.org/drawingml/2006/main" xmlns:r="http://schemas.openxmlformats.org/officeDocument/2006/relationships" xmlns:p="http://schemas.openxmlformats.org/presentationml/2006/main">
+  <p:cSld>
+    <p:spTree>
+      <p:nvGrpSpPr>
+        <p:cNvPr id="1" name=""/>
+        <p:cNvGrpSpPr/>
+        <p:nvPr/>
+      </p:nvGrpSpPr>
+      <p:grpSpPr>
+        <a:xfrm>
+          <a:off x="0" y="0"/>
+          <a:ext cx="0" cy="0"/>
+          <a:chOff x="0" y="0"/>
+          <a:chExt cx="0" cy="0"/>
+        </a:xfrm>
+      </p:grpSpPr>
+      <p:sp>
+        <p:nvSpPr>
+          <p:cNvPr id="2" name="Título 1">
+            <a:extLst>
+              <a:ext uri="{FF2B5EF4-FFF2-40B4-BE49-F238E27FC236}">
+                <a16:creationId xmlns:a16="http://schemas.microsoft.com/office/drawing/2014/main" id="{B06D6EE1-5A55-489E-9809-7B85B20F30CA}"/>
+              </a:ext>
+            </a:extLst>
+          </p:cNvPr>
+          <p:cNvSpPr>
+            <a:spLocks noGrp="1"/>
+          </p:cNvSpPr>
+          <p:nvPr>
+            <p:ph type="title"/>
+          </p:nvPr>
+        </p:nvSpPr>
+        <p:spPr>
+          <a:xfrm>
+            <a:off x="794657" y="2538287"/>
+            <a:ext cx="2717800" cy="802493"/>
+          </a:xfrm>
+        </p:spPr>
+        <p:txBody>
+          <a:bodyPr>
+            <a:normAutofit fontScale="90000"/>
+          </a:bodyPr>
+          <a:lstStyle/>
+          <a:p>
+            <a:r>
+              <a:rPr lang="es-PE" sz="4900" b="1" dirty="0"/>
+              <a:t>EVIDENCIA TC-013</a:t>
+            </a:r>
+            <a:br>
+              <a:rPr lang="es-PE" sz="4900" b="1" dirty="0"/>
+            </a:br>
+            <a:br>
+              <a:rPr lang="es-PE" dirty="0"/>
+            </a:br>
+            <a:endParaRPr lang="es-PE" dirty="0"/>
+          </a:p>
+        </p:txBody>
+      </p:sp>
+      <p:pic>
+        <p:nvPicPr>
+          <p:cNvPr id="8" name="Imagen 7">
+            <a:extLst>
+              <a:ext uri="{FF2B5EF4-FFF2-40B4-BE49-F238E27FC236}">
+                <a16:creationId xmlns:a16="http://schemas.microsoft.com/office/drawing/2014/main" id="{409E4B8E-B38A-4457-8219-E61A578E4C7A}"/>
+              </a:ext>
+            </a:extLst>
+          </p:cNvPr>
+          <p:cNvPicPr>
+            <a:picLocks noChangeAspect="1"/>
+          </p:cNvPicPr>
+          <p:nvPr/>
+        </p:nvPicPr>
+        <p:blipFill>
+          <a:blip r:embed="rId2">
+            <a:extLst>
+              <a:ext uri="{28A0092B-C50C-407E-A947-70E740481C1C}">
+                <a14:useLocalDpi xmlns:a14="http://schemas.microsoft.com/office/drawing/2010/main" val="0"/>
+              </a:ext>
+            </a:extLst>
+          </a:blip>
+          <a:stretch>
+            <a:fillRect/>
+          </a:stretch>
+        </p:blipFill>
+        <p:spPr>
+          <a:xfrm>
+            <a:off x="3512457" y="493485"/>
+            <a:ext cx="2708013" cy="5871029"/>
+          </a:xfrm>
+          <a:prstGeom prst="rect">
+            <a:avLst/>
+          </a:prstGeom>
+        </p:spPr>
+      </p:pic>
+      <p:pic>
+        <p:nvPicPr>
+          <p:cNvPr id="10" name="Imagen 9">
+            <a:extLst>
+              <a:ext uri="{FF2B5EF4-FFF2-40B4-BE49-F238E27FC236}">
+                <a16:creationId xmlns:a16="http://schemas.microsoft.com/office/drawing/2014/main" id="{1B66B59F-6A20-4EF2-8C42-6A096F65ACC8}"/>
+              </a:ext>
+            </a:extLst>
+          </p:cNvPr>
+          <p:cNvPicPr>
+            <a:picLocks noChangeAspect="1"/>
+          </p:cNvPicPr>
+          <p:nvPr/>
+        </p:nvPicPr>
+        <p:blipFill>
+          <a:blip r:embed="rId3">
+            <a:extLst>
+              <a:ext uri="{28A0092B-C50C-407E-A947-70E740481C1C}">
+                <a14:useLocalDpi xmlns:a14="http://schemas.microsoft.com/office/drawing/2010/main" val="0"/>
+              </a:ext>
+            </a:extLst>
+          </a:blip>
+          <a:stretch>
+            <a:fillRect/>
+          </a:stretch>
+        </p:blipFill>
+        <p:spPr>
+          <a:xfrm>
+            <a:off x="6317289" y="499608"/>
+            <a:ext cx="2705188" cy="5864906"/>
+          </a:xfrm>
+          <a:prstGeom prst="rect">
+            <a:avLst/>
+          </a:prstGeom>
+        </p:spPr>
+      </p:pic>
+      <p:pic>
+        <p:nvPicPr>
+          <p:cNvPr id="12" name="Imagen 11">
+            <a:extLst>
+              <a:ext uri="{FF2B5EF4-FFF2-40B4-BE49-F238E27FC236}">
+                <a16:creationId xmlns:a16="http://schemas.microsoft.com/office/drawing/2014/main" id="{11EEA9F3-1EAD-4291-AEBD-22C22D02AE4B}"/>
+              </a:ext>
+            </a:extLst>
+          </p:cNvPr>
+          <p:cNvPicPr>
+            <a:picLocks noChangeAspect="1"/>
+          </p:cNvPicPr>
+          <p:nvPr/>
+        </p:nvPicPr>
+        <p:blipFill>
+          <a:blip r:embed="rId4">
+            <a:extLst>
+              <a:ext uri="{28A0092B-C50C-407E-A947-70E740481C1C}">
+                <a14:useLocalDpi xmlns:a14="http://schemas.microsoft.com/office/drawing/2010/main" val="0"/>
+              </a:ext>
+            </a:extLst>
+          </a:blip>
+          <a:stretch>
+            <a:fillRect/>
+          </a:stretch>
+        </p:blipFill>
+        <p:spPr>
+          <a:xfrm>
+            <a:off x="9251328" y="493485"/>
+            <a:ext cx="2708013" cy="5871030"/>
+          </a:xfrm>
+          <a:prstGeom prst="rect">
+            <a:avLst/>
+          </a:prstGeom>
+        </p:spPr>
+      </p:pic>
+    </p:spTree>
+    <p:extLst>
+      <p:ext uri="{BB962C8B-B14F-4D97-AF65-F5344CB8AC3E}">
+        <p14:creationId xmlns:p14="http://schemas.microsoft.com/office/powerpoint/2010/main" val="1565137776"/>
+      </p:ext>
+    </p:extLst>
+  </p:cSld>
+  <p:clrMapOvr>
+    <a:masterClrMapping/>
+  </p:clrMapOvr>
+</p:sld>
+</file>
+
+<file path=ppt/slides/slide15.xml><?xml version="1.0" encoding="utf-8"?>
+<p:sld xmlns:a="http://schemas.openxmlformats.org/drawingml/2006/main" xmlns:r="http://schemas.openxmlformats.org/officeDocument/2006/relationships" xmlns:p="http://schemas.openxmlformats.org/presentationml/2006/main">
+  <p:cSld>
+    <p:spTree>
+      <p:nvGrpSpPr>
+        <p:cNvPr id="1" name=""/>
+        <p:cNvGrpSpPr/>
+        <p:nvPr/>
+      </p:nvGrpSpPr>
+      <p:grpSpPr>
+        <a:xfrm>
+          <a:off x="0" y="0"/>
+          <a:ext cx="0" cy="0"/>
+          <a:chOff x="0" y="0"/>
+          <a:chExt cx="0" cy="0"/>
+        </a:xfrm>
+      </p:grpSpPr>
+      <p:sp>
+        <p:nvSpPr>
+          <p:cNvPr id="2" name="Título 1">
+            <a:extLst>
+              <a:ext uri="{FF2B5EF4-FFF2-40B4-BE49-F238E27FC236}">
+                <a16:creationId xmlns:a16="http://schemas.microsoft.com/office/drawing/2014/main" id="{B06D6EE1-5A55-489E-9809-7B85B20F30CA}"/>
+              </a:ext>
+            </a:extLst>
+          </p:cNvPr>
+          <p:cNvSpPr>
+            <a:spLocks noGrp="1"/>
+          </p:cNvSpPr>
+          <p:nvPr>
+            <p:ph type="title"/>
+          </p:nvPr>
+        </p:nvSpPr>
+        <p:spPr>
+          <a:xfrm>
+            <a:off x="794657" y="2538287"/>
+            <a:ext cx="2717800" cy="802493"/>
+          </a:xfrm>
+        </p:spPr>
+        <p:txBody>
+          <a:bodyPr>
+            <a:normAutofit fontScale="90000"/>
+          </a:bodyPr>
+          <a:lstStyle/>
+          <a:p>
+            <a:r>
+              <a:rPr lang="es-PE" sz="4900" b="1" dirty="0"/>
+              <a:t>EVIDENCIA TC-014</a:t>
+            </a:r>
+            <a:br>
+              <a:rPr lang="es-PE" dirty="0"/>
+            </a:br>
+            <a:endParaRPr lang="es-PE" dirty="0"/>
+          </a:p>
+        </p:txBody>
+      </p:sp>
+      <p:pic>
+        <p:nvPicPr>
+          <p:cNvPr id="4" name="Imagen 3">
+            <a:extLst>
+              <a:ext uri="{FF2B5EF4-FFF2-40B4-BE49-F238E27FC236}">
+                <a16:creationId xmlns:a16="http://schemas.microsoft.com/office/drawing/2014/main" id="{9916F380-B941-4973-848B-D53FF8FE9670}"/>
+              </a:ext>
+            </a:extLst>
+          </p:cNvPr>
+          <p:cNvPicPr>
+            <a:picLocks noChangeAspect="1"/>
+          </p:cNvPicPr>
+          <p:nvPr/>
+        </p:nvPicPr>
+        <p:blipFill>
+          <a:blip r:embed="rId2">
+            <a:extLst>
+              <a:ext uri="{28A0092B-C50C-407E-A947-70E740481C1C}">
+                <a14:useLocalDpi xmlns:a14="http://schemas.microsoft.com/office/drawing/2010/main" val="0"/>
+              </a:ext>
+            </a:extLst>
+          </a:blip>
+          <a:stretch>
+            <a:fillRect/>
+          </a:stretch>
+        </p:blipFill>
+        <p:spPr>
+          <a:xfrm>
+            <a:off x="7799189" y="682173"/>
+            <a:ext cx="2533949" cy="5493656"/>
+          </a:xfrm>
+          <a:prstGeom prst="rect">
+            <a:avLst/>
+          </a:prstGeom>
+        </p:spPr>
+      </p:pic>
+      <p:pic>
+        <p:nvPicPr>
+          <p:cNvPr id="6" name="Imagen 5">
+            <a:extLst>
+              <a:ext uri="{FF2B5EF4-FFF2-40B4-BE49-F238E27FC236}">
+                <a16:creationId xmlns:a16="http://schemas.microsoft.com/office/drawing/2014/main" id="{90AAAB4A-4F37-47B7-8CB1-E167C4E68077}"/>
+              </a:ext>
+            </a:extLst>
+          </p:cNvPr>
+          <p:cNvPicPr>
+            <a:picLocks noChangeAspect="1"/>
+          </p:cNvPicPr>
+          <p:nvPr/>
+        </p:nvPicPr>
+        <p:blipFill>
+          <a:blip r:embed="rId3">
+            <a:extLst>
+              <a:ext uri="{28A0092B-C50C-407E-A947-70E740481C1C}">
+                <a14:useLocalDpi xmlns:a14="http://schemas.microsoft.com/office/drawing/2010/main" val="0"/>
+              </a:ext>
+            </a:extLst>
+          </a:blip>
+          <a:stretch>
+            <a:fillRect/>
+          </a:stretch>
+        </p:blipFill>
+        <p:spPr>
+          <a:xfrm>
+            <a:off x="4388849" y="682173"/>
+            <a:ext cx="2533949" cy="5493654"/>
+          </a:xfrm>
+          <a:prstGeom prst="rect">
+            <a:avLst/>
+          </a:prstGeom>
+        </p:spPr>
+      </p:pic>
+    </p:spTree>
+    <p:extLst>
+      <p:ext uri="{BB962C8B-B14F-4D97-AF65-F5344CB8AC3E}">
+        <p14:creationId xmlns:p14="http://schemas.microsoft.com/office/powerpoint/2010/main" val="380826004"/>
+      </p:ext>
+    </p:extLst>
+  </p:cSld>
+  <p:clrMapOvr>
+    <a:masterClrMapping/>
+  </p:clrMapOvr>
+</p:sld>
+</file>
+
+<file path=ppt/slides/slide16.xml><?xml version="1.0" encoding="utf-8"?>
+<p:sld xmlns:a="http://schemas.openxmlformats.org/drawingml/2006/main" xmlns:r="http://schemas.openxmlformats.org/officeDocument/2006/relationships" xmlns:p="http://schemas.openxmlformats.org/presentationml/2006/main">
+  <p:cSld>
+    <p:spTree>
+      <p:nvGrpSpPr>
+        <p:cNvPr id="1" name=""/>
+        <p:cNvGrpSpPr/>
+        <p:nvPr/>
+      </p:nvGrpSpPr>
+      <p:grpSpPr>
+        <a:xfrm>
+          <a:off x="0" y="0"/>
+          <a:ext cx="0" cy="0"/>
+          <a:chOff x="0" y="0"/>
+          <a:chExt cx="0" cy="0"/>
+        </a:xfrm>
+      </p:grpSpPr>
+      <p:sp>
+        <p:nvSpPr>
+          <p:cNvPr id="2" name="Título 1">
+            <a:extLst>
+              <a:ext uri="{FF2B5EF4-FFF2-40B4-BE49-F238E27FC236}">
+                <a16:creationId xmlns:a16="http://schemas.microsoft.com/office/drawing/2014/main" id="{B06D6EE1-5A55-489E-9809-7B85B20F30CA}"/>
+              </a:ext>
+            </a:extLst>
+          </p:cNvPr>
+          <p:cNvSpPr>
+            <a:spLocks noGrp="1"/>
+          </p:cNvSpPr>
+          <p:nvPr>
+            <p:ph type="title"/>
+          </p:nvPr>
+        </p:nvSpPr>
+        <p:spPr>
+          <a:xfrm>
+            <a:off x="794657" y="2538287"/>
+            <a:ext cx="2717800" cy="802493"/>
+          </a:xfrm>
+        </p:spPr>
+        <p:txBody>
+          <a:bodyPr>
+            <a:normAutofit fontScale="90000"/>
+          </a:bodyPr>
+          <a:lstStyle/>
+          <a:p>
+            <a:r>
+              <a:rPr lang="es-PE" sz="4900" b="1" dirty="0"/>
+              <a:t>EVIDENCIA TC-015</a:t>
+            </a:r>
+            <a:br>
+              <a:rPr lang="es-PE" dirty="0"/>
+            </a:br>
+            <a:endParaRPr lang="es-PE" dirty="0"/>
+          </a:p>
+        </p:txBody>
+      </p:sp>
+      <p:pic>
+        <p:nvPicPr>
+          <p:cNvPr id="4" name="Imagen 3">
+            <a:extLst>
+              <a:ext uri="{FF2B5EF4-FFF2-40B4-BE49-F238E27FC236}">
+                <a16:creationId xmlns:a16="http://schemas.microsoft.com/office/drawing/2014/main" id="{2D221F84-827A-4139-998E-82DCA1A9A1CE}"/>
+              </a:ext>
+            </a:extLst>
+          </p:cNvPr>
+          <p:cNvPicPr>
+            <a:picLocks noChangeAspect="1"/>
+          </p:cNvPicPr>
+          <p:nvPr/>
+        </p:nvPicPr>
+        <p:blipFill>
+          <a:blip r:embed="rId2">
+            <a:extLst>
+              <a:ext uri="{28A0092B-C50C-407E-A947-70E740481C1C}">
+                <a14:useLocalDpi xmlns:a14="http://schemas.microsoft.com/office/drawing/2010/main" val="0"/>
+              </a:ext>
+            </a:extLst>
+          </a:blip>
+          <a:stretch>
+            <a:fillRect/>
+          </a:stretch>
+        </p:blipFill>
+        <p:spPr>
+          <a:xfrm>
+            <a:off x="3512457" y="621621"/>
+            <a:ext cx="2671191" cy="5791200"/>
+          </a:xfrm>
+          <a:prstGeom prst="rect">
+            <a:avLst/>
+          </a:prstGeom>
+        </p:spPr>
+      </p:pic>
+      <p:pic>
+        <p:nvPicPr>
+          <p:cNvPr id="6" name="Imagen 5">
+            <a:extLst>
+              <a:ext uri="{FF2B5EF4-FFF2-40B4-BE49-F238E27FC236}">
+                <a16:creationId xmlns:a16="http://schemas.microsoft.com/office/drawing/2014/main" id="{52869823-F351-47BA-9A28-ABB4923D8C10}"/>
+              </a:ext>
+            </a:extLst>
+          </p:cNvPr>
+          <p:cNvPicPr>
+            <a:picLocks noChangeAspect="1"/>
+          </p:cNvPicPr>
+          <p:nvPr/>
+        </p:nvPicPr>
+        <p:blipFill>
+          <a:blip r:embed="rId3">
+            <a:extLst>
+              <a:ext uri="{28A0092B-C50C-407E-A947-70E740481C1C}">
+                <a14:useLocalDpi xmlns:a14="http://schemas.microsoft.com/office/drawing/2010/main" val="0"/>
+              </a:ext>
+            </a:extLst>
+          </a:blip>
+          <a:stretch>
+            <a:fillRect/>
+          </a:stretch>
+        </p:blipFill>
+        <p:spPr>
+          <a:xfrm>
+            <a:off x="6445204" y="621621"/>
+            <a:ext cx="2671191" cy="5791200"/>
+          </a:xfrm>
+          <a:prstGeom prst="rect">
+            <a:avLst/>
+          </a:prstGeom>
+        </p:spPr>
+      </p:pic>
+      <p:pic>
+        <p:nvPicPr>
+          <p:cNvPr id="8" name="Imagen 7">
+            <a:extLst>
+              <a:ext uri="{FF2B5EF4-FFF2-40B4-BE49-F238E27FC236}">
+                <a16:creationId xmlns:a16="http://schemas.microsoft.com/office/drawing/2014/main" id="{C409BDFC-16CE-4ED5-B2D2-3EAB04356495}"/>
+              </a:ext>
+            </a:extLst>
+          </p:cNvPr>
+          <p:cNvPicPr>
+            <a:picLocks noChangeAspect="1"/>
+          </p:cNvPicPr>
+          <p:nvPr/>
+        </p:nvPicPr>
+        <p:blipFill>
+          <a:blip r:embed="rId4">
+            <a:extLst>
+              <a:ext uri="{28A0092B-C50C-407E-A947-70E740481C1C}">
+                <a14:useLocalDpi xmlns:a14="http://schemas.microsoft.com/office/drawing/2010/main" val="0"/>
+              </a:ext>
+            </a:extLst>
+          </a:blip>
+          <a:stretch>
+            <a:fillRect/>
+          </a:stretch>
+        </p:blipFill>
+        <p:spPr>
+          <a:xfrm>
+            <a:off x="9376233" y="621621"/>
+            <a:ext cx="2671191" cy="5791200"/>
+          </a:xfrm>
+          <a:prstGeom prst="rect">
+            <a:avLst/>
+          </a:prstGeom>
+        </p:spPr>
+      </p:pic>
+    </p:spTree>
+    <p:extLst>
+      <p:ext uri="{BB962C8B-B14F-4D97-AF65-F5344CB8AC3E}">
+        <p14:creationId xmlns:p14="http://schemas.microsoft.com/office/powerpoint/2010/main" val="1237198832"/>
+      </p:ext>
+    </p:extLst>
+  </p:cSld>
+  <p:clrMapOvr>
+    <a:masterClrMapping/>
+  </p:clrMapOvr>
+</p:sld>
+</file>
+
 <file path=ppt/slides/slide2.xml><?xml version="1.0" encoding="utf-8"?>
 <p:sld xmlns:a="http://schemas.openxmlformats.org/drawingml/2006/main" xmlns:r="http://schemas.openxmlformats.org/officeDocument/2006/relationships" xmlns:p="http://schemas.openxmlformats.org/presentationml/2006/main">
   <p:cSld>
@@ -3865,10 +4946,601 @@
           </a:p>
         </p:txBody>
       </p:sp>
+      <p:pic>
+        <p:nvPicPr>
+          <p:cNvPr id="4" name="Imagen 3">
+            <a:extLst>
+              <a:ext uri="{FF2B5EF4-FFF2-40B4-BE49-F238E27FC236}">
+                <a16:creationId xmlns:a16="http://schemas.microsoft.com/office/drawing/2014/main" id="{E4716155-5A7B-4056-ACB2-CC390B65F9C2}"/>
+              </a:ext>
+            </a:extLst>
+          </p:cNvPr>
+          <p:cNvPicPr>
+            <a:picLocks noChangeAspect="1"/>
+          </p:cNvPicPr>
+          <p:nvPr/>
+        </p:nvPicPr>
+        <p:blipFill rotWithShape="1">
+          <a:blip r:embed="rId2">
+            <a:extLst>
+              <a:ext uri="{28A0092B-C50C-407E-A947-70E740481C1C}">
+                <a14:useLocalDpi xmlns:a14="http://schemas.microsoft.com/office/drawing/2010/main" val="0"/>
+              </a:ext>
+            </a:extLst>
+          </a:blip>
+          <a:srcRect t="4445" b="7090"/>
+          <a:stretch/>
+        </p:blipFill>
+        <p:spPr>
+          <a:xfrm>
+            <a:off x="5065916" y="522514"/>
+            <a:ext cx="3163253" cy="6066972"/>
+          </a:xfrm>
+          <a:prstGeom prst="rect">
+            <a:avLst/>
+          </a:prstGeom>
+        </p:spPr>
+      </p:pic>
     </p:spTree>
     <p:extLst>
       <p:ext uri="{BB962C8B-B14F-4D97-AF65-F5344CB8AC3E}">
         <p14:creationId xmlns:p14="http://schemas.microsoft.com/office/powerpoint/2010/main" val="3235133435"/>
+      </p:ext>
+    </p:extLst>
+  </p:cSld>
+  <p:clrMapOvr>
+    <a:masterClrMapping/>
+  </p:clrMapOvr>
+</p:sld>
+</file>
+
+<file path=ppt/slides/slide6.xml><?xml version="1.0" encoding="utf-8"?>
+<p:sld xmlns:a="http://schemas.openxmlformats.org/drawingml/2006/main" xmlns:r="http://schemas.openxmlformats.org/officeDocument/2006/relationships" xmlns:p="http://schemas.openxmlformats.org/presentationml/2006/main">
+  <p:cSld>
+    <p:spTree>
+      <p:nvGrpSpPr>
+        <p:cNvPr id="1" name=""/>
+        <p:cNvGrpSpPr/>
+        <p:nvPr/>
+      </p:nvGrpSpPr>
+      <p:grpSpPr>
+        <a:xfrm>
+          <a:off x="0" y="0"/>
+          <a:ext cx="0" cy="0"/>
+          <a:chOff x="0" y="0"/>
+          <a:chExt cx="0" cy="0"/>
+        </a:xfrm>
+      </p:grpSpPr>
+      <p:sp>
+        <p:nvSpPr>
+          <p:cNvPr id="2" name="Título 1">
+            <a:extLst>
+              <a:ext uri="{FF2B5EF4-FFF2-40B4-BE49-F238E27FC236}">
+                <a16:creationId xmlns:a16="http://schemas.microsoft.com/office/drawing/2014/main" id="{B06D6EE1-5A55-489E-9809-7B85B20F30CA}"/>
+              </a:ext>
+            </a:extLst>
+          </p:cNvPr>
+          <p:cNvSpPr>
+            <a:spLocks noGrp="1"/>
+          </p:cNvSpPr>
+          <p:nvPr>
+            <p:ph type="title"/>
+          </p:nvPr>
+        </p:nvSpPr>
+        <p:spPr>
+          <a:xfrm>
+            <a:off x="794657" y="2538287"/>
+            <a:ext cx="2717800" cy="802493"/>
+          </a:xfrm>
+        </p:spPr>
+        <p:txBody>
+          <a:bodyPr>
+            <a:normAutofit fontScale="90000"/>
+          </a:bodyPr>
+          <a:lstStyle/>
+          <a:p>
+            <a:r>
+              <a:rPr lang="es-PE" sz="4900" b="1" dirty="0"/>
+              <a:t>EVIDENCIA TC-005</a:t>
+            </a:r>
+            <a:br>
+              <a:rPr lang="es-PE" dirty="0"/>
+            </a:br>
+            <a:endParaRPr lang="es-PE" dirty="0"/>
+          </a:p>
+        </p:txBody>
+      </p:sp>
+      <p:pic>
+        <p:nvPicPr>
+          <p:cNvPr id="5" name="Imagen 4">
+            <a:extLst>
+              <a:ext uri="{FF2B5EF4-FFF2-40B4-BE49-F238E27FC236}">
+                <a16:creationId xmlns:a16="http://schemas.microsoft.com/office/drawing/2014/main" id="{7277DB7F-C90D-4E9E-ADA7-E6BA07B41485}"/>
+              </a:ext>
+            </a:extLst>
+          </p:cNvPr>
+          <p:cNvPicPr>
+            <a:picLocks noChangeAspect="1"/>
+          </p:cNvPicPr>
+          <p:nvPr/>
+        </p:nvPicPr>
+        <p:blipFill rotWithShape="1">
+          <a:blip r:embed="rId2">
+            <a:extLst>
+              <a:ext uri="{28A0092B-C50C-407E-A947-70E740481C1C}">
+                <a14:useLocalDpi xmlns:a14="http://schemas.microsoft.com/office/drawing/2010/main" val="0"/>
+              </a:ext>
+            </a:extLst>
+          </a:blip>
+          <a:srcRect l="446" t="4233" r="2281" b="5397"/>
+          <a:stretch/>
+        </p:blipFill>
+        <p:spPr>
+          <a:xfrm>
+            <a:off x="8069942" y="330200"/>
+            <a:ext cx="3077029" cy="6197600"/>
+          </a:xfrm>
+          <a:prstGeom prst="rect">
+            <a:avLst/>
+          </a:prstGeom>
+        </p:spPr>
+      </p:pic>
+      <p:pic>
+        <p:nvPicPr>
+          <p:cNvPr id="7" name="Imagen 6">
+            <a:extLst>
+              <a:ext uri="{FF2B5EF4-FFF2-40B4-BE49-F238E27FC236}">
+                <a16:creationId xmlns:a16="http://schemas.microsoft.com/office/drawing/2014/main" id="{B0CDA02F-0729-4941-BC6C-C620E648F395}"/>
+              </a:ext>
+            </a:extLst>
+          </p:cNvPr>
+          <p:cNvPicPr>
+            <a:picLocks noChangeAspect="1"/>
+          </p:cNvPicPr>
+          <p:nvPr/>
+        </p:nvPicPr>
+        <p:blipFill rotWithShape="1">
+          <a:blip r:embed="rId3">
+            <a:extLst>
+              <a:ext uri="{28A0092B-C50C-407E-A947-70E740481C1C}">
+                <a14:useLocalDpi xmlns:a14="http://schemas.microsoft.com/office/drawing/2010/main" val="0"/>
+              </a:ext>
+            </a:extLst>
+          </a:blip>
+          <a:srcRect/>
+          <a:stretch/>
+        </p:blipFill>
+        <p:spPr>
+          <a:xfrm>
+            <a:off x="4281283" y="330200"/>
+            <a:ext cx="2845660" cy="6169451"/>
+          </a:xfrm>
+          <a:prstGeom prst="rect">
+            <a:avLst/>
+          </a:prstGeom>
+        </p:spPr>
+      </p:pic>
+    </p:spTree>
+    <p:extLst>
+      <p:ext uri="{BB962C8B-B14F-4D97-AF65-F5344CB8AC3E}">
+        <p14:creationId xmlns:p14="http://schemas.microsoft.com/office/powerpoint/2010/main" val="791864801"/>
+      </p:ext>
+    </p:extLst>
+  </p:cSld>
+  <p:clrMapOvr>
+    <a:masterClrMapping/>
+  </p:clrMapOvr>
+</p:sld>
+</file>
+
+<file path=ppt/slides/slide7.xml><?xml version="1.0" encoding="utf-8"?>
+<p:sld xmlns:a="http://schemas.openxmlformats.org/drawingml/2006/main" xmlns:r="http://schemas.openxmlformats.org/officeDocument/2006/relationships" xmlns:p="http://schemas.openxmlformats.org/presentationml/2006/main">
+  <p:cSld>
+    <p:spTree>
+      <p:nvGrpSpPr>
+        <p:cNvPr id="1" name=""/>
+        <p:cNvGrpSpPr/>
+        <p:nvPr/>
+      </p:nvGrpSpPr>
+      <p:grpSpPr>
+        <a:xfrm>
+          <a:off x="0" y="0"/>
+          <a:ext cx="0" cy="0"/>
+          <a:chOff x="0" y="0"/>
+          <a:chExt cx="0" cy="0"/>
+        </a:xfrm>
+      </p:grpSpPr>
+      <p:sp>
+        <p:nvSpPr>
+          <p:cNvPr id="2" name="Título 1">
+            <a:extLst>
+              <a:ext uri="{FF2B5EF4-FFF2-40B4-BE49-F238E27FC236}">
+                <a16:creationId xmlns:a16="http://schemas.microsoft.com/office/drawing/2014/main" id="{B06D6EE1-5A55-489E-9809-7B85B20F30CA}"/>
+              </a:ext>
+            </a:extLst>
+          </p:cNvPr>
+          <p:cNvSpPr>
+            <a:spLocks noGrp="1"/>
+          </p:cNvSpPr>
+          <p:nvPr>
+            <p:ph type="title"/>
+          </p:nvPr>
+        </p:nvSpPr>
+        <p:spPr>
+          <a:xfrm>
+            <a:off x="794657" y="2538287"/>
+            <a:ext cx="2717800" cy="802493"/>
+          </a:xfrm>
+        </p:spPr>
+        <p:txBody>
+          <a:bodyPr>
+            <a:normAutofit fontScale="90000"/>
+          </a:bodyPr>
+          <a:lstStyle/>
+          <a:p>
+            <a:r>
+              <a:rPr lang="es-PE" sz="4900" b="1" dirty="0"/>
+              <a:t>EVIDENCIA TC-006</a:t>
+            </a:r>
+            <a:br>
+              <a:rPr lang="es-PE" dirty="0"/>
+            </a:br>
+            <a:endParaRPr lang="es-PE" dirty="0"/>
+          </a:p>
+        </p:txBody>
+      </p:sp>
+      <p:pic>
+        <p:nvPicPr>
+          <p:cNvPr id="4" name="Imagen 3">
+            <a:extLst>
+              <a:ext uri="{FF2B5EF4-FFF2-40B4-BE49-F238E27FC236}">
+                <a16:creationId xmlns:a16="http://schemas.microsoft.com/office/drawing/2014/main" id="{3261CCD3-7133-45E3-94BA-BA79184733FB}"/>
+              </a:ext>
+            </a:extLst>
+          </p:cNvPr>
+          <p:cNvPicPr>
+            <a:picLocks noChangeAspect="1"/>
+          </p:cNvPicPr>
+          <p:nvPr/>
+        </p:nvPicPr>
+        <p:blipFill>
+          <a:blip r:embed="rId2">
+            <a:extLst>
+              <a:ext uri="{28A0092B-C50C-407E-A947-70E740481C1C}">
+                <a14:useLocalDpi xmlns:a14="http://schemas.microsoft.com/office/drawing/2010/main" val="0"/>
+              </a:ext>
+            </a:extLst>
+          </a:blip>
+          <a:stretch>
+            <a:fillRect/>
+          </a:stretch>
+        </p:blipFill>
+        <p:spPr>
+          <a:xfrm>
+            <a:off x="4342179" y="442685"/>
+            <a:ext cx="2754876" cy="5972629"/>
+          </a:xfrm>
+          <a:prstGeom prst="rect">
+            <a:avLst/>
+          </a:prstGeom>
+        </p:spPr>
+      </p:pic>
+      <p:pic>
+        <p:nvPicPr>
+          <p:cNvPr id="10" name="Imagen 9">
+            <a:extLst>
+              <a:ext uri="{FF2B5EF4-FFF2-40B4-BE49-F238E27FC236}">
+                <a16:creationId xmlns:a16="http://schemas.microsoft.com/office/drawing/2014/main" id="{10822E32-958C-420C-BA9F-7200D15A7AAE}"/>
+              </a:ext>
+            </a:extLst>
+          </p:cNvPr>
+          <p:cNvPicPr>
+            <a:picLocks noChangeAspect="1"/>
+          </p:cNvPicPr>
+          <p:nvPr/>
+        </p:nvPicPr>
+        <p:blipFill>
+          <a:blip r:embed="rId3">
+            <a:extLst>
+              <a:ext uri="{28A0092B-C50C-407E-A947-70E740481C1C}">
+                <a14:useLocalDpi xmlns:a14="http://schemas.microsoft.com/office/drawing/2010/main" val="0"/>
+              </a:ext>
+            </a:extLst>
+          </a:blip>
+          <a:stretch>
+            <a:fillRect/>
+          </a:stretch>
+        </p:blipFill>
+        <p:spPr>
+          <a:xfrm>
+            <a:off x="7731719" y="442685"/>
+            <a:ext cx="2754876" cy="5972631"/>
+          </a:xfrm>
+          <a:prstGeom prst="rect">
+            <a:avLst/>
+          </a:prstGeom>
+        </p:spPr>
+      </p:pic>
+    </p:spTree>
+    <p:extLst>
+      <p:ext uri="{BB962C8B-B14F-4D97-AF65-F5344CB8AC3E}">
+        <p14:creationId xmlns:p14="http://schemas.microsoft.com/office/powerpoint/2010/main" val="1491665353"/>
+      </p:ext>
+    </p:extLst>
+  </p:cSld>
+  <p:clrMapOvr>
+    <a:masterClrMapping/>
+  </p:clrMapOvr>
+</p:sld>
+</file>
+
+<file path=ppt/slides/slide8.xml><?xml version="1.0" encoding="utf-8"?>
+<p:sld xmlns:a="http://schemas.openxmlformats.org/drawingml/2006/main" xmlns:r="http://schemas.openxmlformats.org/officeDocument/2006/relationships" xmlns:p="http://schemas.openxmlformats.org/presentationml/2006/main">
+  <p:cSld>
+    <p:spTree>
+      <p:nvGrpSpPr>
+        <p:cNvPr id="1" name=""/>
+        <p:cNvGrpSpPr/>
+        <p:nvPr/>
+      </p:nvGrpSpPr>
+      <p:grpSpPr>
+        <a:xfrm>
+          <a:off x="0" y="0"/>
+          <a:ext cx="0" cy="0"/>
+          <a:chOff x="0" y="0"/>
+          <a:chExt cx="0" cy="0"/>
+        </a:xfrm>
+      </p:grpSpPr>
+      <p:sp>
+        <p:nvSpPr>
+          <p:cNvPr id="2" name="Título 1">
+            <a:extLst>
+              <a:ext uri="{FF2B5EF4-FFF2-40B4-BE49-F238E27FC236}">
+                <a16:creationId xmlns:a16="http://schemas.microsoft.com/office/drawing/2014/main" id="{B06D6EE1-5A55-489E-9809-7B85B20F30CA}"/>
+              </a:ext>
+            </a:extLst>
+          </p:cNvPr>
+          <p:cNvSpPr>
+            <a:spLocks noGrp="1"/>
+          </p:cNvSpPr>
+          <p:nvPr>
+            <p:ph type="title"/>
+          </p:nvPr>
+        </p:nvSpPr>
+        <p:spPr>
+          <a:xfrm>
+            <a:off x="794657" y="2538287"/>
+            <a:ext cx="2717800" cy="802493"/>
+          </a:xfrm>
+        </p:spPr>
+        <p:txBody>
+          <a:bodyPr>
+            <a:normAutofit fontScale="90000"/>
+          </a:bodyPr>
+          <a:lstStyle/>
+          <a:p>
+            <a:r>
+              <a:rPr lang="es-PE" sz="4900" b="1" dirty="0"/>
+              <a:t>EVIDENCIA TC-007</a:t>
+            </a:r>
+            <a:br>
+              <a:rPr lang="es-PE" dirty="0"/>
+            </a:br>
+            <a:endParaRPr lang="es-PE" dirty="0"/>
+          </a:p>
+        </p:txBody>
+      </p:sp>
+      <p:pic>
+        <p:nvPicPr>
+          <p:cNvPr id="5" name="Imagen 4">
+            <a:extLst>
+              <a:ext uri="{FF2B5EF4-FFF2-40B4-BE49-F238E27FC236}">
+                <a16:creationId xmlns:a16="http://schemas.microsoft.com/office/drawing/2014/main" id="{12F53C2F-4CDF-477D-85EB-591B04848BF1}"/>
+              </a:ext>
+            </a:extLst>
+          </p:cNvPr>
+          <p:cNvPicPr>
+            <a:picLocks noChangeAspect="1"/>
+          </p:cNvPicPr>
+          <p:nvPr/>
+        </p:nvPicPr>
+        <p:blipFill rotWithShape="1">
+          <a:blip r:embed="rId2">
+            <a:extLst>
+              <a:ext uri="{28A0092B-C50C-407E-A947-70E740481C1C}">
+                <a14:useLocalDpi xmlns:a14="http://schemas.microsoft.com/office/drawing/2010/main" val="0"/>
+              </a:ext>
+            </a:extLst>
+          </a:blip>
+          <a:srcRect t="3386" b="6455"/>
+          <a:stretch/>
+        </p:blipFill>
+        <p:spPr>
+          <a:xfrm>
+            <a:off x="3817687" y="337457"/>
+            <a:ext cx="3163253" cy="6183086"/>
+          </a:xfrm>
+          <a:prstGeom prst="rect">
+            <a:avLst/>
+          </a:prstGeom>
+        </p:spPr>
+      </p:pic>
+      <p:pic>
+        <p:nvPicPr>
+          <p:cNvPr id="7" name="Imagen 6">
+            <a:extLst>
+              <a:ext uri="{FF2B5EF4-FFF2-40B4-BE49-F238E27FC236}">
+                <a16:creationId xmlns:a16="http://schemas.microsoft.com/office/drawing/2014/main" id="{A276E1A1-B853-4EEE-ACE6-34D084FFCC83}"/>
+              </a:ext>
+            </a:extLst>
+          </p:cNvPr>
+          <p:cNvPicPr>
+            <a:picLocks noChangeAspect="1"/>
+          </p:cNvPicPr>
+          <p:nvPr/>
+        </p:nvPicPr>
+        <p:blipFill>
+          <a:blip r:embed="rId3">
+            <a:extLst>
+              <a:ext uri="{28A0092B-C50C-407E-A947-70E740481C1C}">
+                <a14:useLocalDpi xmlns:a14="http://schemas.microsoft.com/office/drawing/2010/main" val="0"/>
+              </a:ext>
+            </a:extLst>
+          </a:blip>
+          <a:stretch>
+            <a:fillRect/>
+          </a:stretch>
+        </p:blipFill>
+        <p:spPr>
+          <a:xfrm>
+            <a:off x="8128430" y="337456"/>
+            <a:ext cx="2858884" cy="6198121"/>
+          </a:xfrm>
+          <a:prstGeom prst="rect">
+            <a:avLst/>
+          </a:prstGeom>
+        </p:spPr>
+      </p:pic>
+    </p:spTree>
+    <p:extLst>
+      <p:ext uri="{BB962C8B-B14F-4D97-AF65-F5344CB8AC3E}">
+        <p14:creationId xmlns:p14="http://schemas.microsoft.com/office/powerpoint/2010/main" val="1444441319"/>
+      </p:ext>
+    </p:extLst>
+  </p:cSld>
+  <p:clrMapOvr>
+    <a:masterClrMapping/>
+  </p:clrMapOvr>
+</p:sld>
+</file>
+
+<file path=ppt/slides/slide9.xml><?xml version="1.0" encoding="utf-8"?>
+<p:sld xmlns:a="http://schemas.openxmlformats.org/drawingml/2006/main" xmlns:r="http://schemas.openxmlformats.org/officeDocument/2006/relationships" xmlns:p="http://schemas.openxmlformats.org/presentationml/2006/main">
+  <p:cSld>
+    <p:spTree>
+      <p:nvGrpSpPr>
+        <p:cNvPr id="1" name=""/>
+        <p:cNvGrpSpPr/>
+        <p:nvPr/>
+      </p:nvGrpSpPr>
+      <p:grpSpPr>
+        <a:xfrm>
+          <a:off x="0" y="0"/>
+          <a:ext cx="0" cy="0"/>
+          <a:chOff x="0" y="0"/>
+          <a:chExt cx="0" cy="0"/>
+        </a:xfrm>
+      </p:grpSpPr>
+      <p:sp>
+        <p:nvSpPr>
+          <p:cNvPr id="2" name="Título 1">
+            <a:extLst>
+              <a:ext uri="{FF2B5EF4-FFF2-40B4-BE49-F238E27FC236}">
+                <a16:creationId xmlns:a16="http://schemas.microsoft.com/office/drawing/2014/main" id="{B06D6EE1-5A55-489E-9809-7B85B20F30CA}"/>
+              </a:ext>
+            </a:extLst>
+          </p:cNvPr>
+          <p:cNvSpPr>
+            <a:spLocks noGrp="1"/>
+          </p:cNvSpPr>
+          <p:nvPr>
+            <p:ph type="title"/>
+          </p:nvPr>
+        </p:nvSpPr>
+        <p:spPr>
+          <a:xfrm>
+            <a:off x="794657" y="2538287"/>
+            <a:ext cx="2717800" cy="802493"/>
+          </a:xfrm>
+        </p:spPr>
+        <p:txBody>
+          <a:bodyPr>
+            <a:normAutofit fontScale="90000"/>
+          </a:bodyPr>
+          <a:lstStyle/>
+          <a:p>
+            <a:r>
+              <a:rPr lang="es-PE" sz="4900" b="1" dirty="0"/>
+              <a:t>EVIDENCIA TC-008</a:t>
+            </a:r>
+            <a:endParaRPr lang="es-PE" dirty="0"/>
+          </a:p>
+        </p:txBody>
+      </p:sp>
+      <p:pic>
+        <p:nvPicPr>
+          <p:cNvPr id="4" name="Imagen 3">
+            <a:extLst>
+              <a:ext uri="{FF2B5EF4-FFF2-40B4-BE49-F238E27FC236}">
+                <a16:creationId xmlns:a16="http://schemas.microsoft.com/office/drawing/2014/main" id="{B7951955-A9E2-48E5-80E5-DC04061EAA22}"/>
+              </a:ext>
+            </a:extLst>
+          </p:cNvPr>
+          <p:cNvPicPr>
+            <a:picLocks noChangeAspect="1"/>
+          </p:cNvPicPr>
+          <p:nvPr/>
+        </p:nvPicPr>
+        <p:blipFill rotWithShape="1">
+          <a:blip r:embed="rId2">
+            <a:extLst>
+              <a:ext uri="{28A0092B-C50C-407E-A947-70E740481C1C}">
+                <a14:useLocalDpi xmlns:a14="http://schemas.microsoft.com/office/drawing/2010/main" val="0"/>
+              </a:ext>
+            </a:extLst>
+          </a:blip>
+          <a:srcRect l="-14" t="4233" r="446" b="26561"/>
+          <a:stretch/>
+        </p:blipFill>
+        <p:spPr>
+          <a:xfrm>
+            <a:off x="4082144" y="1055914"/>
+            <a:ext cx="3149600" cy="4746171"/>
+          </a:xfrm>
+          <a:prstGeom prst="rect">
+            <a:avLst/>
+          </a:prstGeom>
+        </p:spPr>
+      </p:pic>
+      <p:pic>
+        <p:nvPicPr>
+          <p:cNvPr id="8" name="Imagen 7">
+            <a:extLst>
+              <a:ext uri="{FF2B5EF4-FFF2-40B4-BE49-F238E27FC236}">
+                <a16:creationId xmlns:a16="http://schemas.microsoft.com/office/drawing/2014/main" id="{110AD992-9A7A-42A8-BAD0-232D0664363A}"/>
+              </a:ext>
+            </a:extLst>
+          </p:cNvPr>
+          <p:cNvPicPr>
+            <a:picLocks noChangeAspect="1"/>
+          </p:cNvPicPr>
+          <p:nvPr/>
+        </p:nvPicPr>
+        <p:blipFill rotWithShape="1">
+          <a:blip r:embed="rId3">
+            <a:extLst>
+              <a:ext uri="{28A0092B-C50C-407E-A947-70E740481C1C}">
+                <a14:useLocalDpi xmlns:a14="http://schemas.microsoft.com/office/drawing/2010/main" val="0"/>
+              </a:ext>
+            </a:extLst>
+          </a:blip>
+          <a:srcRect l="1134" t="3681" r="-1134" b="5666"/>
+          <a:stretch/>
+        </p:blipFill>
+        <p:spPr>
+          <a:xfrm>
+            <a:off x="7968526" y="769257"/>
+            <a:ext cx="2560729" cy="5032828"/>
+          </a:xfrm>
+          <a:prstGeom prst="rect">
+            <a:avLst/>
+          </a:prstGeom>
+        </p:spPr>
+      </p:pic>
+    </p:spTree>
+    <p:extLst>
+      <p:ext uri="{BB962C8B-B14F-4D97-AF65-F5344CB8AC3E}">
+        <p14:creationId xmlns:p14="http://schemas.microsoft.com/office/powerpoint/2010/main" val="1391241320"/>
       </p:ext>
     </p:extLst>
   </p:cSld>

</xml_diff>